<commit_message>
same changes in note and presentation
</commit_message>
<xml_diff>
--- a/defence_of_progect/presentation.pptx
+++ b/defence_of_progect/presentation.pptx
@@ -7784,12 +7784,12 @@
           </a:p>
           <a:p>
             <a:r>
-              <a:rPr lang="en-US" sz="2800" dirty="0" smtClean="0"/>
-              <a:t> </a:t>
+              <a:rPr lang="ru-RU" sz="2800" smtClean="0"/>
+              <a:t>Несколько </a:t>
             </a:r>
             <a:r>
               <a:rPr lang="ru-RU" sz="2800" dirty="0" smtClean="0"/>
-              <a:t>Несколько форм</a:t>
+              <a:t>форм</a:t>
             </a:r>
             <a:r>
               <a:rPr lang="en-US" sz="2800" dirty="0" smtClean="0"/>

</xml_diff>